<commit_message>
adicao da cardinalidade do UML da AC07
</commit_message>
<xml_diff>
--- a/ACS/AC7/OPE_PlotTwist_AC07_V2.pptx
+++ b/ACS/AC7/OPE_PlotTwist_AC07_V2.pptx
@@ -3581,10 +3581,10 @@
       </p:sp>
       <p:pic>
         <p:nvPicPr>
-          <p:cNvPr id="2" name="Imagem 1">
+          <p:cNvPr id="3" name="Imagem 2">
             <a:extLst>
               <a:ext uri="{FF2B5EF4-FFF2-40B4-BE49-F238E27FC236}">
-                <a16:creationId xmlns:a16="http://schemas.microsoft.com/office/drawing/2014/main" id="{D06E2904-C964-4A0C-9C5D-A22A81C21A34}"/>
+                <a16:creationId xmlns:a16="http://schemas.microsoft.com/office/drawing/2014/main" id="{5244A529-BE4A-45D9-9B1A-D0E99149E118}"/>
               </a:ext>
             </a:extLst>
           </p:cNvPr>
@@ -3601,8 +3601,8 @@
         </p:blipFill>
         <p:spPr>
           <a:xfrm>
-            <a:off x="2803896" y="1663834"/>
-            <a:ext cx="6584207" cy="4011882"/>
+            <a:off x="2376289" y="1029730"/>
+            <a:ext cx="6872486" cy="4432857"/>
           </a:xfrm>
           <a:prstGeom prst="rect">
             <a:avLst/>

</xml_diff>